<commit_message>
Implemented my presentation for what I have so far.
</commit_message>
<xml_diff>
--- a/Resources/Family Tree Project Checkpoint Presentation.pptx
+++ b/Resources/Family Tree Project Checkpoint Presentation.pptx
@@ -6,7 +6,11 @@
   </p:sldMasterIdLst>
   <p:sldIdLst>
     <p:sldId id="256" r:id="rId2"/>
-    <p:sldId id="257" r:id="rId3"/>
+    <p:sldId id="258" r:id="rId3"/>
+    <p:sldId id="257" r:id="rId4"/>
+    <p:sldId id="259" r:id="rId5"/>
+    <p:sldId id="260" r:id="rId6"/>
+    <p:sldId id="261" r:id="rId7"/>
   </p:sldIdLst>
   <p:sldSz cx="12192000" cy="6858000"/>
   <p:notesSz cx="6858000" cy="9144000"/>
@@ -105,7 +109,180 @@
       </a:defRPr>
     </a:lvl9pPr>
   </p:defaultTextStyle>
+  <p:extLst>
+    <p:ext uri="{EFAFB233-063F-42B5-8137-9DF3F51BA10A}">
+      <p15:sldGuideLst xmlns:p15="http://schemas.microsoft.com/office/powerpoint/2012/main"/>
+    </p:ext>
+  </p:extLst>
 </p:presentation>
+</file>
+
+<file path=ppt/revisionInfo.xml><?xml version="1.0" encoding="utf-8"?>
+<p1510:revInfo xmlns:a="http://schemas.openxmlformats.org/drawingml/2006/main" xmlns:r="http://schemas.openxmlformats.org/officeDocument/2006/relationships" xmlns:p1510="http://schemas.microsoft.com/office/powerpoint/2015/10/main">
+  <p1510:revLst>
+    <p1510:client id="{E95AC8B9-4868-4262-82A1-64966F8C837B}" v="1" dt="2025-04-02T18:35:40.310"/>
+  </p1510:revLst>
+</p1510:revInfo>
+</file>
+
+<file path=ppt/changesInfos/changesInfo1.xml><?xml version="1.0" encoding="utf-8"?>
+<pc:chgInfo xmlns:a="http://schemas.openxmlformats.org/drawingml/2006/main" xmlns:r="http://schemas.openxmlformats.org/officeDocument/2006/relationships" xmlns:ac="http://schemas.microsoft.com/office/drawing/2013/main/command" xmlns:pc="http://schemas.microsoft.com/office/powerpoint/2013/main/command">
+  <pc:docChgLst>
+    <pc:chgData name="Zak Merrigan" userId="44bddf86cb50141b" providerId="LiveId" clId="{E95AC8B9-4868-4262-82A1-64966F8C837B}"/>
+    <pc:docChg chg="custSel addSld modSld">
+      <pc:chgData name="Zak Merrigan" userId="44bddf86cb50141b" providerId="LiveId" clId="{E95AC8B9-4868-4262-82A1-64966F8C837B}" dt="2025-04-02T18:59:14.339" v="7577" actId="20577"/>
+      <pc:docMkLst>
+        <pc:docMk/>
+      </pc:docMkLst>
+      <pc:sldChg chg="addSp modSp mod">
+        <pc:chgData name="Zak Merrigan" userId="44bddf86cb50141b" providerId="LiveId" clId="{E95AC8B9-4868-4262-82A1-64966F8C837B}" dt="2025-04-02T18:36:32.514" v="5123" actId="1076"/>
+        <pc:sldMkLst>
+          <pc:docMk/>
+          <pc:sldMk cId="927405858" sldId="256"/>
+        </pc:sldMkLst>
+        <pc:spChg chg="mod">
+          <ac:chgData name="Zak Merrigan" userId="44bddf86cb50141b" providerId="LiveId" clId="{E95AC8B9-4868-4262-82A1-64966F8C837B}" dt="2025-04-02T17:17:39.929" v="44" actId="1076"/>
+          <ac:spMkLst>
+            <pc:docMk/>
+            <pc:sldMk cId="927405858" sldId="256"/>
+            <ac:spMk id="2" creationId="{9425A138-8F43-9643-44A9-61DB71C1937A}"/>
+          </ac:spMkLst>
+        </pc:spChg>
+        <pc:spChg chg="mod">
+          <ac:chgData name="Zak Merrigan" userId="44bddf86cb50141b" providerId="LiveId" clId="{E95AC8B9-4868-4262-82A1-64966F8C837B}" dt="2025-04-02T17:17:54.135" v="64" actId="20577"/>
+          <ac:spMkLst>
+            <pc:docMk/>
+            <pc:sldMk cId="927405858" sldId="256"/>
+            <ac:spMk id="3" creationId="{B0187DD1-82E8-776C-601F-6985AD30E28D}"/>
+          </ac:spMkLst>
+        </pc:spChg>
+        <pc:spChg chg="add mod">
+          <ac:chgData name="Zak Merrigan" userId="44bddf86cb50141b" providerId="LiveId" clId="{E95AC8B9-4868-4262-82A1-64966F8C837B}" dt="2025-04-02T18:36:32.514" v="5123" actId="1076"/>
+          <ac:spMkLst>
+            <pc:docMk/>
+            <pc:sldMk cId="927405858" sldId="256"/>
+            <ac:spMk id="4" creationId="{B9BA3339-917D-E1E3-BA0B-44768AAF6BB7}"/>
+          </ac:spMkLst>
+        </pc:spChg>
+      </pc:sldChg>
+      <pc:sldChg chg="modSp mod">
+        <pc:chgData name="Zak Merrigan" userId="44bddf86cb50141b" providerId="LiveId" clId="{E95AC8B9-4868-4262-82A1-64966F8C837B}" dt="2025-04-02T18:41:15.383" v="5711" actId="20577"/>
+        <pc:sldMkLst>
+          <pc:docMk/>
+          <pc:sldMk cId="635376111" sldId="257"/>
+        </pc:sldMkLst>
+        <pc:spChg chg="mod">
+          <ac:chgData name="Zak Merrigan" userId="44bddf86cb50141b" providerId="LiveId" clId="{E95AC8B9-4868-4262-82A1-64966F8C837B}" dt="2025-04-02T17:28:49.456" v="1123" actId="20577"/>
+          <ac:spMkLst>
+            <pc:docMk/>
+            <pc:sldMk cId="635376111" sldId="257"/>
+            <ac:spMk id="2" creationId="{294D10BB-2D32-EEAB-DBA6-41B9B22C8320}"/>
+          </ac:spMkLst>
+        </pc:spChg>
+        <pc:spChg chg="mod">
+          <ac:chgData name="Zak Merrigan" userId="44bddf86cb50141b" providerId="LiveId" clId="{E95AC8B9-4868-4262-82A1-64966F8C837B}" dt="2025-04-02T18:41:15.383" v="5711" actId="20577"/>
+          <ac:spMkLst>
+            <pc:docMk/>
+            <pc:sldMk cId="635376111" sldId="257"/>
+            <ac:spMk id="3" creationId="{9AB4AA5D-FEF2-BA45-9F08-D3E752BA2DF4}"/>
+          </ac:spMkLst>
+        </pc:spChg>
+      </pc:sldChg>
+      <pc:sldChg chg="modSp new mod">
+        <pc:chgData name="Zak Merrigan" userId="44bddf86cb50141b" providerId="LiveId" clId="{E95AC8B9-4868-4262-82A1-64966F8C837B}" dt="2025-04-02T18:38:41.940" v="5377" actId="20577"/>
+        <pc:sldMkLst>
+          <pc:docMk/>
+          <pc:sldMk cId="3381530167" sldId="258"/>
+        </pc:sldMkLst>
+        <pc:spChg chg="mod">
+          <ac:chgData name="Zak Merrigan" userId="44bddf86cb50141b" providerId="LiveId" clId="{E95AC8B9-4868-4262-82A1-64966F8C837B}" dt="2025-04-02T17:18:13.074" v="74" actId="20577"/>
+          <ac:spMkLst>
+            <pc:docMk/>
+            <pc:sldMk cId="3381530167" sldId="258"/>
+            <ac:spMk id="2" creationId="{E32D93DB-DC5A-7EF1-22B7-8E3C3FDC7832}"/>
+          </ac:spMkLst>
+        </pc:spChg>
+        <pc:spChg chg="mod">
+          <ac:chgData name="Zak Merrigan" userId="44bddf86cb50141b" providerId="LiveId" clId="{E95AC8B9-4868-4262-82A1-64966F8C837B}" dt="2025-04-02T18:38:41.940" v="5377" actId="20577"/>
+          <ac:spMkLst>
+            <pc:docMk/>
+            <pc:sldMk cId="3381530167" sldId="258"/>
+            <ac:spMk id="3" creationId="{38DE7F72-CF9E-254E-5561-3E0E54C21D58}"/>
+          </ac:spMkLst>
+        </pc:spChg>
+      </pc:sldChg>
+      <pc:sldChg chg="modSp new mod">
+        <pc:chgData name="Zak Merrigan" userId="44bddf86cb50141b" providerId="LiveId" clId="{E95AC8B9-4868-4262-82A1-64966F8C837B}" dt="2025-04-02T18:52:47.849" v="6695" actId="20577"/>
+        <pc:sldMkLst>
+          <pc:docMk/>
+          <pc:sldMk cId="3719734127" sldId="259"/>
+        </pc:sldMkLst>
+        <pc:spChg chg="mod">
+          <ac:chgData name="Zak Merrigan" userId="44bddf86cb50141b" providerId="LiveId" clId="{E95AC8B9-4868-4262-82A1-64966F8C837B}" dt="2025-04-02T18:41:51.161" v="5745" actId="20577"/>
+          <ac:spMkLst>
+            <pc:docMk/>
+            <pc:sldMk cId="3719734127" sldId="259"/>
+            <ac:spMk id="2" creationId="{981C3D4F-39B3-97AC-EC93-AF496011ACBD}"/>
+          </ac:spMkLst>
+        </pc:spChg>
+        <pc:spChg chg="mod">
+          <ac:chgData name="Zak Merrigan" userId="44bddf86cb50141b" providerId="LiveId" clId="{E95AC8B9-4868-4262-82A1-64966F8C837B}" dt="2025-04-02T18:52:47.849" v="6695" actId="20577"/>
+          <ac:spMkLst>
+            <pc:docMk/>
+            <pc:sldMk cId="3719734127" sldId="259"/>
+            <ac:spMk id="3" creationId="{7A6155AF-3FC4-301C-F69C-DAA883BD9F11}"/>
+          </ac:spMkLst>
+        </pc:spChg>
+      </pc:sldChg>
+      <pc:sldChg chg="modSp new mod">
+        <pc:chgData name="Zak Merrigan" userId="44bddf86cb50141b" providerId="LiveId" clId="{E95AC8B9-4868-4262-82A1-64966F8C837B}" dt="2025-04-02T18:55:33.058" v="7048" actId="20577"/>
+        <pc:sldMkLst>
+          <pc:docMk/>
+          <pc:sldMk cId="2989515746" sldId="260"/>
+        </pc:sldMkLst>
+        <pc:spChg chg="mod">
+          <ac:chgData name="Zak Merrigan" userId="44bddf86cb50141b" providerId="LiveId" clId="{E95AC8B9-4868-4262-82A1-64966F8C837B}" dt="2025-04-02T17:51:40.271" v="3272" actId="20577"/>
+          <ac:spMkLst>
+            <pc:docMk/>
+            <pc:sldMk cId="2989515746" sldId="260"/>
+            <ac:spMk id="2" creationId="{6FC09152-D5CC-9407-083A-1DE88ABA423A}"/>
+          </ac:spMkLst>
+        </pc:spChg>
+        <pc:spChg chg="mod">
+          <ac:chgData name="Zak Merrigan" userId="44bddf86cb50141b" providerId="LiveId" clId="{E95AC8B9-4868-4262-82A1-64966F8C837B}" dt="2025-04-02T18:55:33.058" v="7048" actId="20577"/>
+          <ac:spMkLst>
+            <pc:docMk/>
+            <pc:sldMk cId="2989515746" sldId="260"/>
+            <ac:spMk id="3" creationId="{186C1318-C8EC-7581-D829-D8BBEBA8DCA3}"/>
+          </ac:spMkLst>
+        </pc:spChg>
+      </pc:sldChg>
+      <pc:sldChg chg="modSp new mod">
+        <pc:chgData name="Zak Merrigan" userId="44bddf86cb50141b" providerId="LiveId" clId="{E95AC8B9-4868-4262-82A1-64966F8C837B}" dt="2025-04-02T18:59:14.339" v="7577" actId="20577"/>
+        <pc:sldMkLst>
+          <pc:docMk/>
+          <pc:sldMk cId="764822039" sldId="261"/>
+        </pc:sldMkLst>
+        <pc:spChg chg="mod">
+          <ac:chgData name="Zak Merrigan" userId="44bddf86cb50141b" providerId="LiveId" clId="{E95AC8B9-4868-4262-82A1-64966F8C837B}" dt="2025-04-02T17:52:39.278" v="3379" actId="20577"/>
+          <ac:spMkLst>
+            <pc:docMk/>
+            <pc:sldMk cId="764822039" sldId="261"/>
+            <ac:spMk id="2" creationId="{3CF113B5-432C-AA70-C0E4-FF609BEE89E0}"/>
+          </ac:spMkLst>
+        </pc:spChg>
+        <pc:spChg chg="mod">
+          <ac:chgData name="Zak Merrigan" userId="44bddf86cb50141b" providerId="LiveId" clId="{E95AC8B9-4868-4262-82A1-64966F8C837B}" dt="2025-04-02T18:59:14.339" v="7577" actId="20577"/>
+          <ac:spMkLst>
+            <pc:docMk/>
+            <pc:sldMk cId="764822039" sldId="261"/>
+            <ac:spMk id="3" creationId="{63083DA9-D3E1-6363-8B04-42E17AAF5FB1}"/>
+          </ac:spMkLst>
+        </pc:spChg>
+      </pc:sldChg>
+    </pc:docChg>
+  </pc:docChgLst>
+</pc:chgInfo>
 </file>
 
 <file path=ppt/slideLayouts/slideLayout1.xml><?xml version="1.0" encoding="utf-8"?>
@@ -255,7 +432,7 @@
           <a:p>
             <a:fld id="{2C47657D-AA8E-45A7-98F5-1667A705A8CB}" type="datetimeFigureOut">
               <a:rPr lang="en-US" smtClean="0"/>
-              <a:t>4/1/2025</a:t>
+              <a:t>4/2/2025</a:t>
             </a:fld>
             <a:endParaRPr lang="en-US"/>
           </a:p>
@@ -453,7 +630,7 @@
           <a:p>
             <a:fld id="{2C47657D-AA8E-45A7-98F5-1667A705A8CB}" type="datetimeFigureOut">
               <a:rPr lang="en-US" smtClean="0"/>
-              <a:t>4/1/2025</a:t>
+              <a:t>4/2/2025</a:t>
             </a:fld>
             <a:endParaRPr lang="en-US"/>
           </a:p>
@@ -661,7 +838,7 @@
           <a:p>
             <a:fld id="{2C47657D-AA8E-45A7-98F5-1667A705A8CB}" type="datetimeFigureOut">
               <a:rPr lang="en-US" smtClean="0"/>
-              <a:t>4/1/2025</a:t>
+              <a:t>4/2/2025</a:t>
             </a:fld>
             <a:endParaRPr lang="en-US"/>
           </a:p>
@@ -859,7 +1036,7 @@
           <a:p>
             <a:fld id="{2C47657D-AA8E-45A7-98F5-1667A705A8CB}" type="datetimeFigureOut">
               <a:rPr lang="en-US" smtClean="0"/>
-              <a:t>4/1/2025</a:t>
+              <a:t>4/2/2025</a:t>
             </a:fld>
             <a:endParaRPr lang="en-US"/>
           </a:p>
@@ -1134,7 +1311,7 @@
           <a:p>
             <a:fld id="{2C47657D-AA8E-45A7-98F5-1667A705A8CB}" type="datetimeFigureOut">
               <a:rPr lang="en-US" smtClean="0"/>
-              <a:t>4/1/2025</a:t>
+              <a:t>4/2/2025</a:t>
             </a:fld>
             <a:endParaRPr lang="en-US"/>
           </a:p>
@@ -1399,7 +1576,7 @@
           <a:p>
             <a:fld id="{2C47657D-AA8E-45A7-98F5-1667A705A8CB}" type="datetimeFigureOut">
               <a:rPr lang="en-US" smtClean="0"/>
-              <a:t>4/1/2025</a:t>
+              <a:t>4/2/2025</a:t>
             </a:fld>
             <a:endParaRPr lang="en-US"/>
           </a:p>
@@ -1811,7 +1988,7 @@
           <a:p>
             <a:fld id="{2C47657D-AA8E-45A7-98F5-1667A705A8CB}" type="datetimeFigureOut">
               <a:rPr lang="en-US" smtClean="0"/>
-              <a:t>4/1/2025</a:t>
+              <a:t>4/2/2025</a:t>
             </a:fld>
             <a:endParaRPr lang="en-US"/>
           </a:p>
@@ -1952,7 +2129,7 @@
           <a:p>
             <a:fld id="{2C47657D-AA8E-45A7-98F5-1667A705A8CB}" type="datetimeFigureOut">
               <a:rPr lang="en-US" smtClean="0"/>
-              <a:t>4/1/2025</a:t>
+              <a:t>4/2/2025</a:t>
             </a:fld>
             <a:endParaRPr lang="en-US"/>
           </a:p>
@@ -2065,7 +2242,7 @@
           <a:p>
             <a:fld id="{2C47657D-AA8E-45A7-98F5-1667A705A8CB}" type="datetimeFigureOut">
               <a:rPr lang="en-US" smtClean="0"/>
-              <a:t>4/1/2025</a:t>
+              <a:t>4/2/2025</a:t>
             </a:fld>
             <a:endParaRPr lang="en-US"/>
           </a:p>
@@ -2376,7 +2553,7 @@
           <a:p>
             <a:fld id="{2C47657D-AA8E-45A7-98F5-1667A705A8CB}" type="datetimeFigureOut">
               <a:rPr lang="en-US" smtClean="0"/>
-              <a:t>4/1/2025</a:t>
+              <a:t>4/2/2025</a:t>
             </a:fld>
             <a:endParaRPr lang="en-US"/>
           </a:p>
@@ -2664,7 +2841,7 @@
           <a:p>
             <a:fld id="{2C47657D-AA8E-45A7-98F5-1667A705A8CB}" type="datetimeFigureOut">
               <a:rPr lang="en-US" smtClean="0"/>
-              <a:t>4/1/2025</a:t>
+              <a:t>4/2/2025</a:t>
             </a:fld>
             <a:endParaRPr lang="en-US"/>
           </a:p>
@@ -2905,7 +3082,7 @@
           <a:p>
             <a:fld id="{2C47657D-AA8E-45A7-98F5-1667A705A8CB}" type="datetimeFigureOut">
               <a:rPr lang="en-US" smtClean="0"/>
-              <a:t>4/1/2025</a:t>
+              <a:t>4/2/2025</a:t>
             </a:fld>
             <a:endParaRPr lang="en-US"/>
           </a:p>
@@ -3340,14 +3517,23 @@
         </p:nvSpPr>
         <p:spPr>
           <a:xfrm>
-            <a:off x="1524000" y="383457"/>
-            <a:ext cx="9144000" cy="1130557"/>
+            <a:off x="3318387" y="570270"/>
+            <a:ext cx="5555226" cy="1622169"/>
           </a:xfrm>
         </p:spPr>
         <p:txBody>
-          <a:bodyPr/>
-          <a:lstStyle/>
-          <a:p>
+          <a:bodyPr>
+            <a:normAutofit fontScale="90000"/>
+          </a:bodyPr>
+          <a:lstStyle/>
+          <a:p>
+            <a:r>
+              <a:rPr lang="en-US" dirty="0"/>
+              <a:t>Pfingsten</a:t>
+            </a:r>
+            <a:br>
+              <a:rPr lang="en-US" dirty="0"/>
+            </a:br>
             <a:r>
               <a:rPr lang="en-US" dirty="0"/>
               <a:t>Family Tree Project</a:t>
@@ -3373,7 +3559,7 @@
         </p:nvSpPr>
         <p:spPr>
           <a:xfrm>
-            <a:off x="3352800" y="2863721"/>
+            <a:off x="3352800" y="2411437"/>
             <a:ext cx="5486400" cy="1130557"/>
           </a:xfrm>
         </p:spPr>
@@ -3383,13 +3569,48 @@
           <a:p>
             <a:r>
               <a:rPr lang="en-US" dirty="0"/>
-              <a:t>Author: Zak Ray Merrigan</a:t>
+              <a:t>Zak Ray Merrigan</a:t>
             </a:r>
           </a:p>
           <a:p>
             <a:r>
               <a:rPr lang="en-US" dirty="0"/>
-              <a:t>Under Mentorship of: Kathy + Jerry Lass</a:t>
+              <a:t>Mentors: Kathy + Jerry Lass</a:t>
+            </a:r>
+          </a:p>
+        </p:txBody>
+      </p:sp>
+      <p:sp>
+        <p:nvSpPr>
+          <p:cNvPr id="4" name="TextBox 3">
+            <a:extLst>
+              <a:ext uri="{FF2B5EF4-FFF2-40B4-BE49-F238E27FC236}">
+                <a16:creationId xmlns:a16="http://schemas.microsoft.com/office/drawing/2014/main" id="{B9BA3339-917D-E1E3-BA0B-44768AAF6BB7}"/>
+              </a:ext>
+            </a:extLst>
+          </p:cNvPr>
+          <p:cNvSpPr txBox="1"/>
+          <p:nvPr/>
+        </p:nvSpPr>
+        <p:spPr>
+          <a:xfrm>
+            <a:off x="2728451" y="3903406"/>
+            <a:ext cx="6735097" cy="369332"/>
+          </a:xfrm>
+          <a:prstGeom prst="rect">
+            <a:avLst/>
+          </a:prstGeom>
+          <a:noFill/>
+        </p:spPr>
+        <p:txBody>
+          <a:bodyPr wrap="square" rtlCol="0">
+            <a:spAutoFit/>
+          </a:bodyPr>
+          <a:lstStyle/>
+          <a:p>
+            <a:r>
+              <a:rPr lang="en-US" dirty="0"/>
+              <a:t>A Modern Family Tree Experience – Built With Purpose and Passion</a:t>
             </a:r>
           </a:p>
         </p:txBody>
@@ -3429,7 +3650,7 @@
           <p:cNvPr id="2" name="Title 1">
             <a:extLst>
               <a:ext uri="{FF2B5EF4-FFF2-40B4-BE49-F238E27FC236}">
-                <a16:creationId xmlns:a16="http://schemas.microsoft.com/office/drawing/2014/main" id="{294D10BB-2D32-EEAB-DBA6-41B9B22C8320}"/>
+                <a16:creationId xmlns:a16="http://schemas.microsoft.com/office/drawing/2014/main" id="{E32D93DB-DC5A-7EF1-22B7-8E3C3FDC7832}"/>
               </a:ext>
             </a:extLst>
           </p:cNvPr>
@@ -3447,7 +3668,7 @@
           <a:p>
             <a:r>
               <a:rPr lang="en-US" dirty="0"/>
-              <a:t>What will I show?</a:t>
+              <a:t>Context</a:t>
             </a:r>
           </a:p>
         </p:txBody>
@@ -3457,7 +3678,7 @@
           <p:cNvPr id="3" name="Content Placeholder 2">
             <a:extLst>
               <a:ext uri="{FF2B5EF4-FFF2-40B4-BE49-F238E27FC236}">
-                <a16:creationId xmlns:a16="http://schemas.microsoft.com/office/drawing/2014/main" id="{9AB4AA5D-FEF2-BA45-9F08-D3E752BA2DF4}"/>
+                <a16:creationId xmlns:a16="http://schemas.microsoft.com/office/drawing/2014/main" id="{38DE7F72-CF9E-254E-5561-3E0E54C21D58}"/>
               </a:ext>
             </a:extLst>
           </p:cNvPr>
@@ -3468,7 +3689,12 @@
             <p:ph idx="1"/>
           </p:nvPr>
         </p:nvSpPr>
-        <p:spPr/>
+        <p:spPr>
+          <a:xfrm>
+            <a:off x="838200" y="1825625"/>
+            <a:ext cx="10515600" cy="3198659"/>
+          </a:xfrm>
+        </p:spPr>
         <p:txBody>
           <a:bodyPr>
             <a:normAutofit/>
@@ -3477,55 +3703,131 @@
           <a:p>
             <a:r>
               <a:rPr lang="en-US" dirty="0"/>
-              <a:t>Website:</a:t>
+              <a:t>On July 2023, I joined the committee to bring our family tree into the digital age.</a:t>
             </a:r>
           </a:p>
           <a:p>
             <a:pPr lvl="1"/>
             <a:r>
               <a:rPr lang="en-US" dirty="0"/>
-              <a:t>Browse the family tree by family name (e.g., Pfingsten)</a:t>
-            </a:r>
-          </a:p>
-          <a:p>
-            <a:pPr lvl="1"/>
+              <a:t>This project let me combine my passion for software development with ongoing learning, while also contributing something meaningful to our family legacy.</a:t>
+            </a:r>
+          </a:p>
+        </p:txBody>
+      </p:sp>
+    </p:spTree>
+    <p:extLst>
+      <p:ext uri="{BB962C8B-B14F-4D97-AF65-F5344CB8AC3E}">
+        <p14:creationId xmlns:p14="http://schemas.microsoft.com/office/powerpoint/2010/main" val="3381530167"/>
+      </p:ext>
+    </p:extLst>
+  </p:cSld>
+  <p:clrMapOvr>
+    <a:masterClrMapping/>
+  </p:clrMapOvr>
+</p:sld>
+</file>
+
+<file path=ppt/slides/slide3.xml><?xml version="1.0" encoding="utf-8"?>
+<p:sld xmlns:a="http://schemas.openxmlformats.org/drawingml/2006/main" xmlns:r="http://schemas.openxmlformats.org/officeDocument/2006/relationships" xmlns:p="http://schemas.openxmlformats.org/presentationml/2006/main">
+  <p:cSld>
+    <p:spTree>
+      <p:nvGrpSpPr>
+        <p:cNvPr id="1" name=""/>
+        <p:cNvGrpSpPr/>
+        <p:nvPr/>
+      </p:nvGrpSpPr>
+      <p:grpSpPr>
+        <a:xfrm>
+          <a:off x="0" y="0"/>
+          <a:ext cx="0" cy="0"/>
+          <a:chOff x="0" y="0"/>
+          <a:chExt cx="0" cy="0"/>
+        </a:xfrm>
+      </p:grpSpPr>
+      <p:sp>
+        <p:nvSpPr>
+          <p:cNvPr id="2" name="Title 1">
+            <a:extLst>
+              <a:ext uri="{FF2B5EF4-FFF2-40B4-BE49-F238E27FC236}">
+                <a16:creationId xmlns:a16="http://schemas.microsoft.com/office/drawing/2014/main" id="{294D10BB-2D32-EEAB-DBA6-41B9B22C8320}"/>
+              </a:ext>
+            </a:extLst>
+          </p:cNvPr>
+          <p:cNvSpPr>
+            <a:spLocks noGrp="1"/>
+          </p:cNvSpPr>
+          <p:nvPr>
+            <p:ph type="title"/>
+          </p:nvPr>
+        </p:nvSpPr>
+        <p:spPr/>
+        <p:txBody>
+          <a:bodyPr/>
+          <a:lstStyle/>
+          <a:p>
             <a:r>
               <a:rPr lang="en-US" dirty="0"/>
-              <a:t>View a specific Family Dynamic</a:t>
-            </a:r>
-          </a:p>
-          <a:p>
-            <a:pPr lvl="1"/>
+              <a:t>What will I show? (Locally Hosted Website)</a:t>
+            </a:r>
+          </a:p>
+        </p:txBody>
+      </p:sp>
+      <p:sp>
+        <p:nvSpPr>
+          <p:cNvPr id="3" name="Content Placeholder 2">
+            <a:extLst>
+              <a:ext uri="{FF2B5EF4-FFF2-40B4-BE49-F238E27FC236}">
+                <a16:creationId xmlns:a16="http://schemas.microsoft.com/office/drawing/2014/main" id="{9AB4AA5D-FEF2-BA45-9F08-D3E752BA2DF4}"/>
+              </a:ext>
+            </a:extLst>
+          </p:cNvPr>
+          <p:cNvSpPr>
+            <a:spLocks noGrp="1"/>
+          </p:cNvSpPr>
+          <p:nvPr>
+            <p:ph idx="1"/>
+          </p:nvPr>
+        </p:nvSpPr>
+        <p:spPr>
+          <a:xfrm>
+            <a:off x="838200" y="2238580"/>
+            <a:ext cx="10515600" cy="3002014"/>
+          </a:xfrm>
+        </p:spPr>
+        <p:txBody>
+          <a:bodyPr>
+            <a:normAutofit/>
+          </a:bodyPr>
+          <a:lstStyle/>
+          <a:p>
             <a:r>
               <a:rPr lang="en-US" dirty="0"/>
-              <a:t>Understand the connections between Family Dynamics</a:t>
-            </a:r>
-          </a:p>
-          <a:p>
-            <a:pPr lvl="1"/>
+              <a:t>Start with a family name (e.g., Pfingsten) to explore that branch</a:t>
+            </a:r>
+          </a:p>
+          <a:p>
             <a:r>
               <a:rPr lang="en-US" dirty="0"/>
-              <a:t>Follow a path to a Family Dynamic</a:t>
-            </a:r>
-          </a:p>
-          <a:p>
-            <a:pPr lvl="1"/>
+              <a:t>View detailed information for any Family Dynamic</a:t>
+            </a:r>
+          </a:p>
+          <a:p>
             <a:r>
               <a:rPr lang="en-US" dirty="0"/>
-              <a:t>Each Pfingsten can report updates such as reporting marriages, deceased members, and children.</a:t>
+              <a:t>Understand how family groups connect over generations</a:t>
             </a:r>
           </a:p>
           <a:p>
             <a:r>
               <a:rPr lang="en-US" dirty="0"/>
-              <a:t>Template:</a:t>
-            </a:r>
-          </a:p>
-          <a:p>
-            <a:pPr lvl="1"/>
+              <a:t>Follow someone’s full path in the tree.</a:t>
+            </a:r>
+          </a:p>
+          <a:p>
             <a:r>
               <a:rPr lang="en-US" dirty="0"/>
-              <a:t>Instead of using generation numbers, each family connection now has a coordinate—like a GPS—showing exactly where it belongs in the family tree.</a:t>
+              <a:t>Report updates: new marriages, children, or loved ones who’ve passed.</a:t>
             </a:r>
           </a:p>
         </p:txBody>
@@ -3534,6 +3836,376 @@
     <p:extLst>
       <p:ext uri="{BB962C8B-B14F-4D97-AF65-F5344CB8AC3E}">
         <p14:creationId xmlns:p14="http://schemas.microsoft.com/office/powerpoint/2010/main" val="635376111"/>
+      </p:ext>
+    </p:extLst>
+  </p:cSld>
+  <p:clrMapOvr>
+    <a:masterClrMapping/>
+  </p:clrMapOvr>
+</p:sld>
+</file>
+
+<file path=ppt/slides/slide4.xml><?xml version="1.0" encoding="utf-8"?>
+<p:sld xmlns:a="http://schemas.openxmlformats.org/drawingml/2006/main" xmlns:r="http://schemas.openxmlformats.org/officeDocument/2006/relationships" xmlns:p="http://schemas.openxmlformats.org/presentationml/2006/main">
+  <p:cSld>
+    <p:spTree>
+      <p:nvGrpSpPr>
+        <p:cNvPr id="1" name=""/>
+        <p:cNvGrpSpPr/>
+        <p:nvPr/>
+      </p:nvGrpSpPr>
+      <p:grpSpPr>
+        <a:xfrm>
+          <a:off x="0" y="0"/>
+          <a:ext cx="0" cy="0"/>
+          <a:chOff x="0" y="0"/>
+          <a:chExt cx="0" cy="0"/>
+        </a:xfrm>
+      </p:grpSpPr>
+      <p:sp>
+        <p:nvSpPr>
+          <p:cNvPr id="2" name="Title 1">
+            <a:extLst>
+              <a:ext uri="{FF2B5EF4-FFF2-40B4-BE49-F238E27FC236}">
+                <a16:creationId xmlns:a16="http://schemas.microsoft.com/office/drawing/2014/main" id="{981C3D4F-39B3-97AC-EC93-AF496011ACBD}"/>
+              </a:ext>
+            </a:extLst>
+          </p:cNvPr>
+          <p:cNvSpPr>
+            <a:spLocks noGrp="1"/>
+          </p:cNvSpPr>
+          <p:nvPr>
+            <p:ph type="title"/>
+          </p:nvPr>
+        </p:nvSpPr>
+        <p:spPr/>
+        <p:txBody>
+          <a:bodyPr/>
+          <a:lstStyle/>
+          <a:p>
+            <a:r>
+              <a:rPr lang="en-US" dirty="0"/>
+              <a:t>Why I created a New Template</a:t>
+            </a:r>
+          </a:p>
+        </p:txBody>
+      </p:sp>
+      <p:sp>
+        <p:nvSpPr>
+          <p:cNvPr id="3" name="Content Placeholder 2">
+            <a:extLst>
+              <a:ext uri="{FF2B5EF4-FFF2-40B4-BE49-F238E27FC236}">
+                <a16:creationId xmlns:a16="http://schemas.microsoft.com/office/drawing/2014/main" id="{7A6155AF-3FC4-301C-F69C-DAA883BD9F11}"/>
+              </a:ext>
+            </a:extLst>
+          </p:cNvPr>
+          <p:cNvSpPr>
+            <a:spLocks noGrp="1"/>
+          </p:cNvSpPr>
+          <p:nvPr>
+            <p:ph idx="1"/>
+          </p:nvPr>
+        </p:nvSpPr>
+        <p:spPr>
+          <a:xfrm>
+            <a:off x="838200" y="1845290"/>
+            <a:ext cx="10515600" cy="4142556"/>
+          </a:xfrm>
+        </p:spPr>
+        <p:txBody>
+          <a:bodyPr>
+            <a:normAutofit lnSpcReduction="10000"/>
+          </a:bodyPr>
+          <a:lstStyle/>
+          <a:p>
+            <a:r>
+              <a:rPr lang="en-US" dirty="0"/>
+              <a:t>The Original template was great but had limitations:</a:t>
+            </a:r>
+          </a:p>
+          <a:p>
+            <a:pPr lvl="1"/>
+            <a:r>
+              <a:rPr lang="en-US" dirty="0"/>
+              <a:t>It assumed a fixed number of generations</a:t>
+            </a:r>
+          </a:p>
+          <a:p>
+            <a:pPr lvl="1"/>
+            <a:r>
+              <a:rPr lang="en-US" dirty="0"/>
+              <a:t>It didn’t handle remarriages or blended families cleanly</a:t>
+            </a:r>
+          </a:p>
+          <a:p>
+            <a:pPr lvl="1"/>
+            <a:r>
+              <a:rPr lang="en-US" dirty="0"/>
+              <a:t>Lack of the birth dates provided</a:t>
+            </a:r>
+          </a:p>
+          <a:p>
+            <a:r>
+              <a:rPr lang="en-US" dirty="0"/>
+              <a:t>I built a flexible template where each family unit stands alone</a:t>
+            </a:r>
+          </a:p>
+          <a:p>
+            <a:r>
+              <a:rPr lang="en-US" dirty="0"/>
+              <a:t>You’ll notice a special numbering system in the next part—it might look a little different than expected</a:t>
+            </a:r>
+          </a:p>
+          <a:p>
+            <a:pPr lvl="1"/>
+            <a:r>
+              <a:rPr lang="en-US" dirty="0"/>
+              <a:t>These numbers come from a method used in Graph Theory, which helps organize and trace relationships</a:t>
+            </a:r>
+          </a:p>
+          <a:p>
+            <a:pPr lvl="1"/>
+            <a:r>
+              <a:rPr lang="en-US" dirty="0"/>
+              <a:t>If anything is unclear, I’m happy to explain more, answer questions, or adjust based on your feedback.</a:t>
+            </a:r>
+          </a:p>
+        </p:txBody>
+      </p:sp>
+    </p:spTree>
+    <p:extLst>
+      <p:ext uri="{BB962C8B-B14F-4D97-AF65-F5344CB8AC3E}">
+        <p14:creationId xmlns:p14="http://schemas.microsoft.com/office/powerpoint/2010/main" val="3719734127"/>
+      </p:ext>
+    </p:extLst>
+  </p:cSld>
+  <p:clrMapOvr>
+    <a:masterClrMapping/>
+  </p:clrMapOvr>
+</p:sld>
+</file>
+
+<file path=ppt/slides/slide5.xml><?xml version="1.0" encoding="utf-8"?>
+<p:sld xmlns:a="http://schemas.openxmlformats.org/drawingml/2006/main" xmlns:r="http://schemas.openxmlformats.org/officeDocument/2006/relationships" xmlns:p="http://schemas.openxmlformats.org/presentationml/2006/main">
+  <p:cSld>
+    <p:spTree>
+      <p:nvGrpSpPr>
+        <p:cNvPr id="1" name=""/>
+        <p:cNvGrpSpPr/>
+        <p:nvPr/>
+      </p:nvGrpSpPr>
+      <p:grpSpPr>
+        <a:xfrm>
+          <a:off x="0" y="0"/>
+          <a:ext cx="0" cy="0"/>
+          <a:chOff x="0" y="0"/>
+          <a:chExt cx="0" cy="0"/>
+        </a:xfrm>
+      </p:grpSpPr>
+      <p:sp>
+        <p:nvSpPr>
+          <p:cNvPr id="2" name="Title 1">
+            <a:extLst>
+              <a:ext uri="{FF2B5EF4-FFF2-40B4-BE49-F238E27FC236}">
+                <a16:creationId xmlns:a16="http://schemas.microsoft.com/office/drawing/2014/main" id="{6FC09152-D5CC-9407-083A-1DE88ABA423A}"/>
+              </a:ext>
+            </a:extLst>
+          </p:cNvPr>
+          <p:cNvSpPr>
+            <a:spLocks noGrp="1"/>
+          </p:cNvSpPr>
+          <p:nvPr>
+            <p:ph type="title"/>
+          </p:nvPr>
+        </p:nvSpPr>
+        <p:spPr/>
+        <p:txBody>
+          <a:bodyPr/>
+          <a:lstStyle/>
+          <a:p>
+            <a:r>
+              <a:rPr lang="en-US" dirty="0"/>
+              <a:t>What’s next</a:t>
+            </a:r>
+          </a:p>
+        </p:txBody>
+      </p:sp>
+      <p:sp>
+        <p:nvSpPr>
+          <p:cNvPr id="3" name="Content Placeholder 2">
+            <a:extLst>
+              <a:ext uri="{FF2B5EF4-FFF2-40B4-BE49-F238E27FC236}">
+                <a16:creationId xmlns:a16="http://schemas.microsoft.com/office/drawing/2014/main" id="{186C1318-C8EC-7581-D829-D8BBEBA8DCA3}"/>
+              </a:ext>
+            </a:extLst>
+          </p:cNvPr>
+          <p:cNvSpPr>
+            <a:spLocks noGrp="1"/>
+          </p:cNvSpPr>
+          <p:nvPr>
+            <p:ph idx="1"/>
+          </p:nvPr>
+        </p:nvSpPr>
+        <p:spPr/>
+        <p:txBody>
+          <a:bodyPr/>
+          <a:lstStyle/>
+          <a:p>
+            <a:r>
+              <a:rPr lang="en-US" dirty="0"/>
+              <a:t>I plan to migrate this project to the cloud so it can live online.</a:t>
+            </a:r>
+          </a:p>
+          <a:p>
+            <a:r>
+              <a:rPr lang="en-US" dirty="0"/>
+              <a:t>This includes:</a:t>
+            </a:r>
+          </a:p>
+          <a:p>
+            <a:pPr lvl="1"/>
+            <a:r>
+              <a:rPr lang="en-US" dirty="0"/>
+              <a:t>Pay-as-you-go hosting on Azure</a:t>
+            </a:r>
+          </a:p>
+          <a:p>
+            <a:pPr lvl="1"/>
+            <a:r>
+              <a:rPr lang="en-US" dirty="0"/>
+              <a:t>Safe, scalable storage for data and photos</a:t>
+            </a:r>
+          </a:p>
+          <a:p>
+            <a:pPr lvl="1"/>
+            <a:r>
+              <a:rPr lang="en-US" dirty="0"/>
+              <a:t>Advanced tech like containerization and multi-type databases (It’s all part of my continued learning and preparation for a software career).</a:t>
+            </a:r>
+          </a:p>
+        </p:txBody>
+      </p:sp>
+    </p:spTree>
+    <p:extLst>
+      <p:ext uri="{BB962C8B-B14F-4D97-AF65-F5344CB8AC3E}">
+        <p14:creationId xmlns:p14="http://schemas.microsoft.com/office/powerpoint/2010/main" val="2989515746"/>
+      </p:ext>
+    </p:extLst>
+  </p:cSld>
+  <p:clrMapOvr>
+    <a:masterClrMapping/>
+  </p:clrMapOvr>
+</p:sld>
+</file>
+
+<file path=ppt/slides/slide6.xml><?xml version="1.0" encoding="utf-8"?>
+<p:sld xmlns:a="http://schemas.openxmlformats.org/drawingml/2006/main" xmlns:r="http://schemas.openxmlformats.org/officeDocument/2006/relationships" xmlns:p="http://schemas.openxmlformats.org/presentationml/2006/main">
+  <p:cSld>
+    <p:spTree>
+      <p:nvGrpSpPr>
+        <p:cNvPr id="1" name=""/>
+        <p:cNvGrpSpPr/>
+        <p:nvPr/>
+      </p:nvGrpSpPr>
+      <p:grpSpPr>
+        <a:xfrm>
+          <a:off x="0" y="0"/>
+          <a:ext cx="0" cy="0"/>
+          <a:chOff x="0" y="0"/>
+          <a:chExt cx="0" cy="0"/>
+        </a:xfrm>
+      </p:grpSpPr>
+      <p:sp>
+        <p:nvSpPr>
+          <p:cNvPr id="2" name="Title 1">
+            <a:extLst>
+              <a:ext uri="{FF2B5EF4-FFF2-40B4-BE49-F238E27FC236}">
+                <a16:creationId xmlns:a16="http://schemas.microsoft.com/office/drawing/2014/main" id="{3CF113B5-432C-AA70-C0E4-FF609BEE89E0}"/>
+              </a:ext>
+            </a:extLst>
+          </p:cNvPr>
+          <p:cNvSpPr>
+            <a:spLocks noGrp="1"/>
+          </p:cNvSpPr>
+          <p:nvPr>
+            <p:ph type="title"/>
+          </p:nvPr>
+        </p:nvSpPr>
+        <p:spPr/>
+        <p:txBody>
+          <a:bodyPr/>
+          <a:lstStyle/>
+          <a:p>
+            <a:r>
+              <a:rPr lang="en-US" dirty="0"/>
+              <a:t>Committee Status</a:t>
+            </a:r>
+          </a:p>
+        </p:txBody>
+      </p:sp>
+      <p:sp>
+        <p:nvSpPr>
+          <p:cNvPr id="3" name="Content Placeholder 2">
+            <a:extLst>
+              <a:ext uri="{FF2B5EF4-FFF2-40B4-BE49-F238E27FC236}">
+                <a16:creationId xmlns:a16="http://schemas.microsoft.com/office/drawing/2014/main" id="{63083DA9-D3E1-6363-8B04-42E17AAF5FB1}"/>
+              </a:ext>
+            </a:extLst>
+          </p:cNvPr>
+          <p:cNvSpPr>
+            <a:spLocks noGrp="1"/>
+          </p:cNvSpPr>
+          <p:nvPr>
+            <p:ph idx="1"/>
+          </p:nvPr>
+        </p:nvSpPr>
+        <p:spPr>
+          <a:xfrm>
+            <a:off x="487926" y="1422502"/>
+            <a:ext cx="11216148" cy="5224104"/>
+          </a:xfrm>
+        </p:spPr>
+        <p:txBody>
+          <a:bodyPr>
+            <a:normAutofit/>
+          </a:bodyPr>
+          <a:lstStyle/>
+          <a:p>
+            <a:r>
+              <a:rPr lang="en-US" dirty="0"/>
+              <a:t>Over time, I’ve realized my learning goals have moved in a different direction.</a:t>
+            </a:r>
+          </a:p>
+          <a:p>
+            <a:r>
+              <a:rPr lang="en-US" dirty="0"/>
+              <a:t>With so many family tree tools already out there, I’m focusing more on what will help me grow professionally.</a:t>
+            </a:r>
+          </a:p>
+          <a:p>
+            <a:r>
+              <a:rPr lang="en-US" dirty="0"/>
+              <a:t>I’d like to move to “standby” status until 2027, when I hope to rejoin with new experience—whether through my version or existing software.</a:t>
+            </a:r>
+          </a:p>
+          <a:p>
+            <a:r>
+              <a:rPr lang="en-US" b="1" dirty="0"/>
+              <a:t>I’d be grateful to have access to the most recent family book and photos for learning and testing purposes.</a:t>
+            </a:r>
+          </a:p>
+          <a:p>
+            <a:pPr marL="457200" lvl="1" indent="0">
+              <a:buNone/>
+            </a:pPr>
+            <a:endParaRPr lang="en-US" dirty="0"/>
+          </a:p>
+        </p:txBody>
+      </p:sp>
+    </p:spTree>
+    <p:extLst>
+      <p:ext uri="{BB962C8B-B14F-4D97-AF65-F5344CB8AC3E}">
+        <p14:creationId xmlns:p14="http://schemas.microsoft.com/office/powerpoint/2010/main" val="764822039"/>
       </p:ext>
     </p:extLst>
   </p:cSld>

</xml_diff>